<commit_message>
add expression of blittable types
</commit_message>
<xml_diff>
--- a/slides/instruction/principleWindows_6.pptx
+++ b/slides/instruction/principleWindows_6.pptx
@@ -4351,6 +4351,171 @@
 </p:notes>
 </file>
 
+<file path=ppt/notesSlides/notesSlide8.xml><?xml version="1.0" encoding="utf-8"?>
+<p:notes xmlns:a="http://schemas.openxmlformats.org/drawingml/2006/main" xmlns:r="http://schemas.openxmlformats.org/officeDocument/2006/relationships" xmlns:p="http://schemas.openxmlformats.org/presentationml/2006/main">
+  <p:cSld>
+    <p:spTree>
+      <p:nvGrpSpPr>
+        <p:cNvPr id="1" name=""/>
+        <p:cNvGrpSpPr/>
+        <p:nvPr/>
+      </p:nvGrpSpPr>
+      <p:grpSpPr>
+        <a:xfrm>
+          <a:off x="0" y="0"/>
+          <a:ext cx="0" cy="0"/>
+          <a:chOff x="0" y="0"/>
+          <a:chExt cx="0" cy="0"/>
+        </a:xfrm>
+      </p:grpSpPr>
+      <p:sp>
+        <p:nvSpPr>
+          <p:cNvPr id="2" name="幻灯片图像占位符 1"/>
+          <p:cNvSpPr>
+            <a:spLocks noGrp="1" noRot="1" noChangeAspect="1"/>
+          </p:cNvSpPr>
+          <p:nvPr>
+            <p:ph type="sldImg"/>
+          </p:nvPr>
+        </p:nvSpPr>
+        <p:spPr/>
+      </p:sp>
+      <p:sp>
+        <p:nvSpPr>
+          <p:cNvPr id="3" name="备注占位符 2"/>
+          <p:cNvSpPr>
+            <a:spLocks noGrp="1"/>
+          </p:cNvSpPr>
+          <p:nvPr>
+            <p:ph type="body" idx="1"/>
+          </p:nvPr>
+        </p:nvSpPr>
+        <p:spPr/>
+        <p:txBody>
+          <a:bodyPr/>
+          <a:lstStyle/>
+          <a:p>
+            <a:r>
+              <a:rPr lang="en-US" altLang="zh-CN" dirty="0"/>
+              <a:t>https://docs.microsoft.com/en-us/dotnet/framework/interop/blittable-and-non-blittable-types?redirectedfrom=MSDN</a:t>
+            </a:r>
+          </a:p>
+          <a:p>
+            <a:endParaRPr lang="en-US" altLang="zh-CN" dirty="0"/>
+          </a:p>
+          <a:p>
+            <a:pPr algn="l"/>
+            <a:r>
+              <a:rPr lang="en-US" altLang="zh-CN" b="0" i="0" dirty="0">
+                <a:solidFill>
+                  <a:srgbClr val="E3E3E3"/>
+                </a:solidFill>
+                <a:effectLst/>
+                <a:latin typeface="Segoe UI" panose="020B0502040204020203" pitchFamily="34" charset="0"/>
+              </a:rPr>
+              <a:t>The following complex types are also blittable types:</a:t>
+            </a:r>
+          </a:p>
+          <a:p>
+            <a:pPr algn="l">
+              <a:buFont typeface="Arial" panose="020B0604020202020204" pitchFamily="34" charset="0"/>
+              <a:buChar char="•"/>
+            </a:pPr>
+            <a:r>
+              <a:rPr lang="en-US" altLang="zh-CN" b="0" i="0" dirty="0">
+                <a:solidFill>
+                  <a:srgbClr val="E3E3E3"/>
+                </a:solidFill>
+                <a:effectLst/>
+                <a:latin typeface="Segoe UI" panose="020B0502040204020203" pitchFamily="34" charset="0"/>
+              </a:rPr>
+              <a:t> One-dimensional arrays of blittable types, such as an array of integers. However, a type that contains a variable array of blittable types is not itself blittable.</a:t>
+            </a:r>
+          </a:p>
+          <a:p>
+            <a:pPr algn="l">
+              <a:buFont typeface="Arial" panose="020B0604020202020204" pitchFamily="34" charset="0"/>
+              <a:buChar char="•"/>
+            </a:pPr>
+            <a:r>
+              <a:rPr lang="en-US" altLang="zh-CN" b="0" i="0" dirty="0">
+                <a:solidFill>
+                  <a:srgbClr val="E3E3E3"/>
+                </a:solidFill>
+                <a:effectLst/>
+                <a:latin typeface="Segoe UI" panose="020B0502040204020203" pitchFamily="34" charset="0"/>
+              </a:rPr>
+              <a:t> Formatted value types that contain only blittable types (and classes if they are marshaled as formatted types). For more information about formatted value types, see </a:t>
+            </a:r>
+            <a:r>
+              <a:rPr lang="en-US" altLang="zh-CN" b="0" i="0" u="none" strike="noStrike" dirty="0">
+                <a:solidFill>
+                  <a:srgbClr val="E3E3E3"/>
+                </a:solidFill>
+                <a:effectLst/>
+                <a:latin typeface="Segoe UI" panose="020B0502040204020203" pitchFamily="34" charset="0"/>
+                <a:hlinkClick r:id="rId3">
+                  <a:extLst>
+                    <a:ext uri="{A12FA001-AC4F-418D-AE19-62706E023703}">
+                      <ahyp:hlinkClr xmlns:ahyp="http://schemas.microsoft.com/office/drawing/2018/hyperlinkcolor" val="tx"/>
+                    </a:ext>
+                  </a:extLst>
+                </a:hlinkClick>
+              </a:rPr>
+              <a:t>Default marshaling for value types</a:t>
+            </a:r>
+            <a:r>
+              <a:rPr lang="en-US" altLang="zh-CN" b="0" i="0" dirty="0">
+                <a:solidFill>
+                  <a:srgbClr val="E3E3E3"/>
+                </a:solidFill>
+                <a:effectLst/>
+                <a:latin typeface="Segoe UI" panose="020B0502040204020203" pitchFamily="34" charset="0"/>
+              </a:rPr>
+              <a:t>.</a:t>
+            </a:r>
+          </a:p>
+          <a:p>
+            <a:endParaRPr lang="zh-CN" altLang="en-US" dirty="0"/>
+          </a:p>
+        </p:txBody>
+      </p:sp>
+      <p:sp>
+        <p:nvSpPr>
+          <p:cNvPr id="4" name="灯片编号占位符 3"/>
+          <p:cNvSpPr>
+            <a:spLocks noGrp="1"/>
+          </p:cNvSpPr>
+          <p:nvPr>
+            <p:ph type="sldNum" sz="quarter" idx="5"/>
+          </p:nvPr>
+        </p:nvSpPr>
+        <p:spPr/>
+        <p:txBody>
+          <a:bodyPr/>
+          <a:lstStyle/>
+          <a:p>
+            <a:fld id="{FF6B7014-1CA7-42FF-9E69-87C27AE33F47}" type="slidenum">
+              <a:rPr lang="zh-CN" altLang="en-US" smtClean="0"/>
+              <a:t>36</a:t>
+            </a:fld>
+            <a:endParaRPr lang="zh-CN" altLang="en-US"/>
+          </a:p>
+        </p:txBody>
+      </p:sp>
+    </p:spTree>
+    <p:extLst>
+      <p:ext uri="{BB962C8B-B14F-4D97-AF65-F5344CB8AC3E}">
+        <p14:creationId xmlns:p14="http://schemas.microsoft.com/office/powerpoint/2010/main" val="3267480669"/>
+      </p:ext>
+    </p:extLst>
+  </p:cSld>
+  <p:clrMapOvr>
+    <a:masterClrMapping/>
+  </p:clrMapOvr>
+</p:notes>
+</file>
+
 <file path=ppt/slideLayouts/slideLayout1.xml><?xml version="1.0" encoding="utf-8"?>
 <p:sldLayout xmlns:a="http://schemas.openxmlformats.org/drawingml/2006/main" xmlns:r="http://schemas.openxmlformats.org/officeDocument/2006/relationships" xmlns:p="http://schemas.openxmlformats.org/presentationml/2006/main" type="title" preserve="1">
   <p:cSld name="标题幻灯片">

</xml_diff>